<commit_message>
Remove high-level agenda slide
</commit_message>
<xml_diff>
--- a/Presentations/AI_Immersion_Phase_0_Overview.pptx
+++ b/Presentations/AI_Immersion_Phase_0_Overview.pptx
@@ -5,21 +5,20 @@
     <p:sldMasterId id="2147484229" r:id="rId4"/>
   </p:sldMasterIdLst>
   <p:notesMasterIdLst>
-    <p:notesMasterId r:id="rId14"/>
+    <p:notesMasterId r:id="rId13"/>
   </p:notesMasterIdLst>
   <p:handoutMasterIdLst>
-    <p:handoutMasterId r:id="rId15"/>
+    <p:handoutMasterId r:id="rId14"/>
   </p:handoutMasterIdLst>
   <p:sldIdLst>
     <p:sldId id="1485" r:id="rId5"/>
     <p:sldId id="1519" r:id="rId6"/>
     <p:sldId id="1549" r:id="rId7"/>
-    <p:sldId id="1553" r:id="rId8"/>
-    <p:sldId id="1557" r:id="rId9"/>
-    <p:sldId id="1556" r:id="rId10"/>
-    <p:sldId id="1554" r:id="rId11"/>
-    <p:sldId id="1555" r:id="rId12"/>
-    <p:sldId id="1532" r:id="rId13"/>
+    <p:sldId id="1557" r:id="rId8"/>
+    <p:sldId id="1556" r:id="rId9"/>
+    <p:sldId id="1554" r:id="rId10"/>
+    <p:sldId id="1555" r:id="rId11"/>
+    <p:sldId id="1532" r:id="rId12"/>
   </p:sldIdLst>
   <p:sldSz cx="12436475" cy="6994525"/>
   <p:notesSz cx="6858000" cy="9144000"/>
@@ -126,7 +125,6 @@
             <p14:sldId id="1485"/>
             <p14:sldId id="1519"/>
             <p14:sldId id="1549"/>
-            <p14:sldId id="1553"/>
             <p14:sldId id="1557"/>
             <p14:sldId id="1556"/>
             <p14:sldId id="1554"/>
@@ -271,7 +269,7 @@
               <a:rPr lang="en-US" smtClean="0">
                 <a:latin typeface="Segoe UI" pitchFamily="34" charset="0"/>
               </a:rPr>
-              <a:t>5/6/2017 6:04 PM</a:t>
+              <a:t>5/9/2017 9:05 AM</a:t>
             </a:fld>
             <a:endParaRPr lang="en-US" dirty="0">
               <a:latin typeface="Segoe UI" pitchFamily="34" charset="0"/>
@@ -568,7 +566,7 @@
           <a:p>
             <a:fld id="{D18B56EA-E28F-4F92-9F16-7A6F2501B303}" type="datetime8">
               <a:rPr lang="en-US" smtClean="0"/>
-              <a:t>5/6/2017 3:55 PM</a:t>
+              <a:t>5/9/2017 8:58 AM</a:t>
             </a:fld>
             <a:endParaRPr lang="en-US" dirty="0"/>
           </a:p>
@@ -954,7 +952,7 @@
           <a:p>
             <a:fld id="{88B44C4B-E218-4158-810E-47EF8FD635FD}" type="datetime8">
               <a:rPr lang="en-US" smtClean="0"/>
-              <a:t>5/6/2017 3:55 PM</a:t>
+              <a:t>5/9/2017 8:58 AM</a:t>
             </a:fld>
             <a:endParaRPr lang="en-US" dirty="0"/>
           </a:p>
@@ -1138,7 +1136,7 @@
           <a:p>
             <a:fld id="{8683C9CD-37C6-4B53-B210-CC8F66F90493}" type="datetime8">
               <a:rPr lang="en-US" smtClean="0"/>
-              <a:t>5/6/2017 3:55 PM</a:t>
+              <a:t>5/9/2017 8:58 AM</a:t>
             </a:fld>
             <a:endParaRPr lang="en-US" dirty="0"/>
           </a:p>
@@ -1501,7 +1499,7 @@
           <a:p>
             <a:fld id="{EA2B2ED8-C573-45EF-BF68-CEC19505703A}" type="datetime8">
               <a:rPr lang="en-US" smtClean="0"/>
-              <a:t>5/6/2017 3:55 PM</a:t>
+              <a:t>5/9/2017 8:58 AM</a:t>
             </a:fld>
             <a:endParaRPr lang="en-US" dirty="0"/>
           </a:p>
@@ -1678,7 +1676,7 @@
             <a:fld id="{B4008EB6-D09E-4580-8CD6-DDB14511944F}" type="slidenum">
               <a:rPr lang="en-US" smtClean="0"/>
               <a:pPr/>
-              <a:t>4</a:t>
+              <a:t>5</a:t>
             </a:fld>
             <a:endParaRPr lang="en-US" dirty="0"/>
           </a:p>
@@ -1701,7 +1699,7 @@
           <a:p>
             <a:fld id="{5A70A388-5CB4-42F2-85B9-1AE1F63398FA}" type="datetime8">
               <a:rPr lang="en-US" smtClean="0"/>
-              <a:t>5/6/2017 3:55 PM</a:t>
+              <a:t>5/9/2017 8:58 AM</a:t>
             </a:fld>
             <a:endParaRPr lang="en-US" dirty="0"/>
           </a:p>
@@ -1783,7 +1781,7 @@
     </p:spTree>
     <p:extLst>
       <p:ext uri="{BB962C8B-B14F-4D97-AF65-F5344CB8AC3E}">
-        <p14:creationId xmlns:p14="http://schemas.microsoft.com/office/powerpoint/2010/main" val="812857072"/>
+        <p14:creationId xmlns:p14="http://schemas.microsoft.com/office/powerpoint/2010/main" val="3515775730"/>
       </p:ext>
     </p:extLst>
   </p:cSld>
@@ -1882,7 +1880,7 @@
           <a:p>
             <a:fld id="{5A70A388-5CB4-42F2-85B9-1AE1F63398FA}" type="datetime8">
               <a:rPr lang="en-US" smtClean="0"/>
-              <a:t>5/6/2017 6:04 PM</a:t>
+              <a:t>5/9/2017 8:58 AM</a:t>
             </a:fld>
             <a:endParaRPr lang="en-US" dirty="0"/>
           </a:p>
@@ -1964,7 +1962,7 @@
     </p:spTree>
     <p:extLst>
       <p:ext uri="{BB962C8B-B14F-4D97-AF65-F5344CB8AC3E}">
-        <p14:creationId xmlns:p14="http://schemas.microsoft.com/office/powerpoint/2010/main" val="3515775730"/>
+        <p14:creationId xmlns:p14="http://schemas.microsoft.com/office/powerpoint/2010/main" val="3271016396"/>
       </p:ext>
     </p:extLst>
   </p:cSld>
@@ -1975,187 +1973,6 @@
 </file>
 
 <file path=ppt/notesSlides/notesSlide6.xml><?xml version="1.0" encoding="utf-8"?>
-<p:notes xmlns:a="http://schemas.openxmlformats.org/drawingml/2006/main" xmlns:r="http://schemas.openxmlformats.org/officeDocument/2006/relationships" xmlns:p="http://schemas.openxmlformats.org/presentationml/2006/main">
-  <p:cSld>
-    <p:spTree>
-      <p:nvGrpSpPr>
-        <p:cNvPr id="1" name=""/>
-        <p:cNvGrpSpPr/>
-        <p:nvPr/>
-      </p:nvGrpSpPr>
-      <p:grpSpPr>
-        <a:xfrm>
-          <a:off x="0" y="0"/>
-          <a:ext cx="0" cy="0"/>
-          <a:chOff x="0" y="0"/>
-          <a:chExt cx="0" cy="0"/>
-        </a:xfrm>
-      </p:grpSpPr>
-      <p:sp>
-        <p:nvSpPr>
-          <p:cNvPr id="2" name="Slide Image Placeholder 1"/>
-          <p:cNvSpPr>
-            <a:spLocks noGrp="1" noRot="1" noChangeAspect="1"/>
-          </p:cNvSpPr>
-          <p:nvPr>
-            <p:ph type="sldImg"/>
-          </p:nvPr>
-        </p:nvSpPr>
-        <p:spPr/>
-      </p:sp>
-      <p:sp>
-        <p:nvSpPr>
-          <p:cNvPr id="3" name="Notes Placeholder 2"/>
-          <p:cNvSpPr>
-            <a:spLocks noGrp="1"/>
-          </p:cNvSpPr>
-          <p:nvPr>
-            <p:ph type="body" idx="1"/>
-          </p:nvPr>
-        </p:nvSpPr>
-        <p:spPr/>
-        <p:txBody>
-          <a:bodyPr/>
-          <a:lstStyle/>
-          <a:p>
-            <a:endParaRPr lang="en-US" dirty="0"/>
-          </a:p>
-        </p:txBody>
-      </p:sp>
-      <p:sp>
-        <p:nvSpPr>
-          <p:cNvPr id="6" name="Slide Number Placeholder 5"/>
-          <p:cNvSpPr>
-            <a:spLocks noGrp="1"/>
-          </p:cNvSpPr>
-          <p:nvPr>
-            <p:ph type="sldNum" sz="quarter" idx="12"/>
-          </p:nvPr>
-        </p:nvSpPr>
-        <p:spPr/>
-        <p:txBody>
-          <a:bodyPr/>
-          <a:lstStyle/>
-          <a:p>
-            <a:fld id="{B4008EB6-D09E-4580-8CD6-DDB14511944F}" type="slidenum">
-              <a:rPr lang="en-US" smtClean="0"/>
-              <a:pPr/>
-              <a:t>7</a:t>
-            </a:fld>
-            <a:endParaRPr lang="en-US" dirty="0"/>
-          </a:p>
-        </p:txBody>
-      </p:sp>
-      <p:sp>
-        <p:nvSpPr>
-          <p:cNvPr id="10" name="Date Placeholder 9"/>
-          <p:cNvSpPr>
-            <a:spLocks noGrp="1"/>
-          </p:cNvSpPr>
-          <p:nvPr>
-            <p:ph type="dt" idx="13"/>
-          </p:nvPr>
-        </p:nvSpPr>
-        <p:spPr/>
-        <p:txBody>
-          <a:bodyPr/>
-          <a:lstStyle/>
-          <a:p>
-            <a:fld id="{5A70A388-5CB4-42F2-85B9-1AE1F63398FA}" type="datetime8">
-              <a:rPr lang="en-US" smtClean="0"/>
-              <a:t>5/6/2017 3:55 PM</a:t>
-            </a:fld>
-            <a:endParaRPr lang="en-US" dirty="0"/>
-          </a:p>
-        </p:txBody>
-      </p:sp>
-      <p:sp>
-        <p:nvSpPr>
-          <p:cNvPr id="12" name="Header Placeholder 11"/>
-          <p:cNvSpPr>
-            <a:spLocks noGrp="1"/>
-          </p:cNvSpPr>
-          <p:nvPr>
-            <p:ph type="hdr" sz="quarter" idx="15"/>
-          </p:nvPr>
-        </p:nvSpPr>
-        <p:spPr/>
-        <p:txBody>
-          <a:bodyPr/>
-          <a:lstStyle/>
-          <a:p>
-            <a:endParaRPr lang="en-US" dirty="0"/>
-          </a:p>
-        </p:txBody>
-      </p:sp>
-      <p:sp>
-        <p:nvSpPr>
-          <p:cNvPr id="5" name="Footer Placeholder 4"/>
-          <p:cNvSpPr>
-            <a:spLocks noGrp="1"/>
-          </p:cNvSpPr>
-          <p:nvPr>
-            <p:ph type="ftr" sz="quarter" idx="16"/>
-          </p:nvPr>
-        </p:nvSpPr>
-        <p:spPr/>
-        <p:txBody>
-          <a:bodyPr/>
-          <a:lstStyle/>
-          <a:p>
-            <a:pPr defTabSz="914099" eaLnBrk="0" hangingPunct="0"/>
-            <a:r>
-              <a:rPr lang="en-US" sz="400">
-                <a:gradFill>
-                  <a:gsLst>
-                    <a:gs pos="0">
-                      <a:prstClr val="black"/>
-                    </a:gs>
-                    <a:gs pos="100000">
-                      <a:prstClr val="black"/>
-                    </a:gs>
-                  </a:gsLst>
-                  <a:lin ang="5400000" scaled="0"/>
-                </a:gradFill>
-                <a:latin typeface="Segoe UI" pitchFamily="34" charset="0"/>
-                <a:ea typeface="Segoe UI" pitchFamily="34" charset="0"/>
-                <a:cs typeface="Segoe UI" pitchFamily="34" charset="0"/>
-              </a:rPr>
-              <a:t>© Microsoft Corporation. All rights reserved. MICROSOFT MAKES NO WARRANTIES, EXPRESS, IMPLIED OR STATUTORY, AS TO THE INFORMATION IN THIS PRESENTATION.</a:t>
-            </a:r>
-            <a:endParaRPr lang="en-US" sz="400" dirty="0">
-              <a:gradFill>
-                <a:gsLst>
-                  <a:gs pos="0">
-                    <a:prstClr val="black"/>
-                  </a:gs>
-                  <a:gs pos="100000">
-                    <a:prstClr val="black"/>
-                  </a:gs>
-                </a:gsLst>
-                <a:lin ang="5400000" scaled="0"/>
-              </a:gradFill>
-              <a:latin typeface="Segoe UI" pitchFamily="34" charset="0"/>
-              <a:ea typeface="Segoe UI" pitchFamily="34" charset="0"/>
-              <a:cs typeface="Segoe UI" pitchFamily="34" charset="0"/>
-            </a:endParaRPr>
-          </a:p>
-        </p:txBody>
-      </p:sp>
-    </p:spTree>
-    <p:extLst>
-      <p:ext uri="{BB962C8B-B14F-4D97-AF65-F5344CB8AC3E}">
-        <p14:creationId xmlns:p14="http://schemas.microsoft.com/office/powerpoint/2010/main" val="3271016396"/>
-      </p:ext>
-    </p:extLst>
-  </p:cSld>
-  <p:clrMapOvr>
-    <a:masterClrMapping/>
-  </p:clrMapOvr>
-</p:notes>
-</file>
-
-<file path=ppt/notesSlides/notesSlide7.xml><?xml version="1.0" encoding="utf-8"?>
 <p:notes xmlns:a="http://schemas.openxmlformats.org/drawingml/2006/main" xmlns:r="http://schemas.openxmlformats.org/officeDocument/2006/relationships" xmlns:p="http://schemas.openxmlformats.org/presentationml/2006/main">
   <p:cSld>
     <p:spTree>
@@ -2265,7 +2082,7 @@
                   <a:prstClr val="black"/>
                 </a:solidFill>
               </a:rPr>
-              <a:t>5/6/2017 3:55 PM</a:t>
+              <a:t>5/9/2017 8:58 AM</a:t>
             </a:fld>
             <a:endParaRPr lang="en-US" dirty="0">
               <a:solidFill>
@@ -2297,7 +2114,7 @@
                 </a:solidFill>
               </a:rPr>
               <a:pPr/>
-              <a:t>9</a:t>
+              <a:t>8</a:t>
             </a:fld>
             <a:endParaRPr lang="en-US" dirty="0">
               <a:solidFill>
@@ -9006,129 +8823,6 @@
       </p:grpSpPr>
       <p:sp>
         <p:nvSpPr>
-          <p:cNvPr id="17" name="Title 16"/>
-          <p:cNvSpPr>
-            <a:spLocks noGrp="1"/>
-          </p:cNvSpPr>
-          <p:nvPr>
-            <p:ph type="title"/>
-          </p:nvPr>
-        </p:nvSpPr>
-        <p:spPr/>
-        <p:txBody>
-          <a:bodyPr/>
-          <a:lstStyle/>
-          <a:p>
-            <a:r>
-              <a:rPr lang="en-US" dirty="0"/>
-              <a:t>Agenda</a:t>
-            </a:r>
-          </a:p>
-        </p:txBody>
-      </p:sp>
-      <p:sp>
-        <p:nvSpPr>
-          <p:cNvPr id="6" name="Text Placeholder 5"/>
-          <p:cNvSpPr>
-            <a:spLocks noGrp="1"/>
-          </p:cNvSpPr>
-          <p:nvPr>
-            <p:ph type="body" sz="quarter" idx="10"/>
-          </p:nvPr>
-        </p:nvSpPr>
-        <p:spPr>
-          <a:xfrm>
-            <a:off x="274702" y="1058862"/>
-            <a:ext cx="11888787" cy="3120854"/>
-          </a:xfrm>
-        </p:spPr>
-        <p:txBody>
-          <a:bodyPr/>
-          <a:lstStyle/>
-          <a:p>
-            <a:r>
-              <a:rPr lang="en-US" dirty="0"/>
-              <a:t>Overview and Scenario</a:t>
-            </a:r>
-          </a:p>
-          <a:p>
-            <a:r>
-              <a:rPr lang="en-US" dirty="0"/>
-              <a:t>Phase 1 </a:t>
-            </a:r>
-            <a:r>
-              <a:rPr lang="en-US"/>
-              <a:t>+ Lunch – </a:t>
-            </a:r>
-            <a:r>
-              <a:rPr lang="en-US" dirty="0"/>
-              <a:t>11:00 – 2:15</a:t>
-            </a:r>
-          </a:p>
-          <a:p>
-            <a:r>
-              <a:rPr lang="en-US" dirty="0"/>
-              <a:t>Phase 2 – 2:15 – 3:30</a:t>
-            </a:r>
-          </a:p>
-          <a:p>
-            <a:r>
-              <a:rPr lang="en-US" dirty="0"/>
-              <a:t>Phase 3 – 3:30 – 5:00</a:t>
-            </a:r>
-          </a:p>
-          <a:p>
-            <a:r>
-              <a:rPr lang="en-US" dirty="0"/>
-              <a:t>Concluding Remarks</a:t>
-            </a:r>
-          </a:p>
-        </p:txBody>
-      </p:sp>
-    </p:spTree>
-    <p:extLst>
-      <p:ext uri="{BB962C8B-B14F-4D97-AF65-F5344CB8AC3E}">
-        <p14:creationId xmlns:p14="http://schemas.microsoft.com/office/powerpoint/2010/main" val="1089436478"/>
-      </p:ext>
-    </p:extLst>
-  </p:cSld>
-  <p:clrMapOvr>
-    <a:masterClrMapping/>
-  </p:clrMapOvr>
-  <mc:AlternateContent xmlns:mc="http://schemas.openxmlformats.org/markup-compatibility/2006" xmlns:p14="http://schemas.microsoft.com/office/powerpoint/2010/main">
-    <mc:Choice Requires="p14">
-      <p:transition spd="med" p14:dur="700">
-        <p:fade/>
-      </p:transition>
-    </mc:Choice>
-    <mc:Fallback xmlns="">
-      <p:transition spd="med">
-        <p:fade/>
-      </p:transition>
-    </mc:Fallback>
-  </mc:AlternateContent>
-</p:sld>
-</file>
-
-<file path=ppt/slides/slide5.xml><?xml version="1.0" encoding="utf-8"?>
-<p:sld xmlns:a="http://schemas.openxmlformats.org/drawingml/2006/main" xmlns:r="http://schemas.openxmlformats.org/officeDocument/2006/relationships" xmlns:p="http://schemas.openxmlformats.org/presentationml/2006/main">
-  <p:cSld>
-    <p:spTree>
-      <p:nvGrpSpPr>
-        <p:cNvPr id="1" name=""/>
-        <p:cNvGrpSpPr/>
-        <p:nvPr/>
-      </p:nvGrpSpPr>
-      <p:grpSpPr>
-        <a:xfrm>
-          <a:off x="0" y="0"/>
-          <a:ext cx="0" cy="0"/>
-          <a:chOff x="0" y="0"/>
-          <a:chExt cx="0" cy="0"/>
-        </a:xfrm>
-      </p:grpSpPr>
-      <p:sp>
-        <p:nvSpPr>
           <p:cNvPr id="2" name="Title 1"/>
           <p:cNvSpPr>
             <a:spLocks noGrp="1"/>
@@ -9240,6 +8934,163 @@
 </p:sld>
 </file>
 
+<file path=ppt/slides/slide5.xml><?xml version="1.0" encoding="utf-8"?>
+<p:sld xmlns:a="http://schemas.openxmlformats.org/drawingml/2006/main" xmlns:r="http://schemas.openxmlformats.org/officeDocument/2006/relationships" xmlns:p="http://schemas.openxmlformats.org/presentationml/2006/main">
+  <p:cSld>
+    <p:spTree>
+      <p:nvGrpSpPr>
+        <p:cNvPr id="1" name=""/>
+        <p:cNvGrpSpPr/>
+        <p:nvPr/>
+      </p:nvGrpSpPr>
+      <p:grpSpPr>
+        <a:xfrm>
+          <a:off x="0" y="0"/>
+          <a:ext cx="0" cy="0"/>
+          <a:chOff x="0" y="0"/>
+          <a:chExt cx="0" cy="0"/>
+        </a:xfrm>
+      </p:grpSpPr>
+      <p:sp>
+        <p:nvSpPr>
+          <p:cNvPr id="17" name="Title 16"/>
+          <p:cNvSpPr>
+            <a:spLocks noGrp="1"/>
+          </p:cNvSpPr>
+          <p:nvPr>
+            <p:ph type="title"/>
+          </p:nvPr>
+        </p:nvSpPr>
+        <p:spPr/>
+        <p:txBody>
+          <a:bodyPr/>
+          <a:lstStyle/>
+          <a:p>
+            <a:r>
+              <a:rPr lang="en-US" dirty="0"/>
+              <a:t>Agenda</a:t>
+            </a:r>
+          </a:p>
+        </p:txBody>
+      </p:sp>
+      <p:sp>
+        <p:nvSpPr>
+          <p:cNvPr id="6" name="Text Placeholder 5"/>
+          <p:cNvSpPr>
+            <a:spLocks noGrp="1"/>
+          </p:cNvSpPr>
+          <p:nvPr>
+            <p:ph type="body" sz="quarter" idx="10"/>
+          </p:nvPr>
+        </p:nvSpPr>
+        <p:spPr>
+          <a:xfrm>
+            <a:off x="274702" y="1058862"/>
+            <a:ext cx="11888787" cy="5964710"/>
+          </a:xfrm>
+        </p:spPr>
+        <p:txBody>
+          <a:bodyPr/>
+          <a:lstStyle/>
+          <a:p>
+            <a:r>
+              <a:rPr lang="en-US" dirty="0"/>
+              <a:t>Overview and Scenario</a:t>
+            </a:r>
+          </a:p>
+          <a:p>
+            <a:r>
+              <a:rPr lang="en-US" dirty="0"/>
+              <a:t>Phase 1 – 11:00 – 2:15</a:t>
+            </a:r>
+          </a:p>
+          <a:p>
+            <a:pPr lvl="1"/>
+            <a:r>
+              <a:rPr lang="en-US" dirty="0"/>
+              <a:t>Tour of the Cognitive Services and DocumentDB</a:t>
+            </a:r>
+          </a:p>
+          <a:p>
+            <a:pPr lvl="1"/>
+            <a:r>
+              <a:rPr lang="en-US" dirty="0"/>
+              <a:t>Hands-on – Calling Vision Services, Writing to DocumentDB</a:t>
+            </a:r>
+          </a:p>
+          <a:p>
+            <a:r>
+              <a:rPr lang="en-US" dirty="0"/>
+              <a:t>Phase 2 – 2:15 – 3:30</a:t>
+            </a:r>
+          </a:p>
+          <a:p>
+            <a:pPr lvl="1"/>
+            <a:r>
+              <a:rPr lang="en-US" dirty="0"/>
+              <a:t>Tour of Azure Search</a:t>
+            </a:r>
+          </a:p>
+          <a:p>
+            <a:pPr lvl="1"/>
+            <a:r>
+              <a:rPr lang="en-US" dirty="0"/>
+              <a:t>Hands-on –Building and Querying an Index</a:t>
+            </a:r>
+          </a:p>
+          <a:p>
+            <a:r>
+              <a:rPr lang="en-US" dirty="0"/>
+              <a:t>Phase 3 – 3:30 – 5:00</a:t>
+            </a:r>
+          </a:p>
+          <a:p>
+            <a:pPr lvl="1"/>
+            <a:r>
+              <a:rPr lang="en-US" dirty="0"/>
+              <a:t>Tour of the Bot Framework</a:t>
+            </a:r>
+          </a:p>
+          <a:p>
+            <a:pPr lvl="1"/>
+            <a:r>
+              <a:rPr lang="en-US" dirty="0"/>
+              <a:t>Hands-on – Building a Query Bot</a:t>
+            </a:r>
+          </a:p>
+          <a:p>
+            <a:r>
+              <a:rPr lang="en-US" dirty="0"/>
+              <a:t>Concluding Remarks</a:t>
+            </a:r>
+          </a:p>
+        </p:txBody>
+      </p:sp>
+    </p:spTree>
+    <p:extLst>
+      <p:ext uri="{BB962C8B-B14F-4D97-AF65-F5344CB8AC3E}">
+        <p14:creationId xmlns:p14="http://schemas.microsoft.com/office/powerpoint/2010/main" val="3859324103"/>
+      </p:ext>
+    </p:extLst>
+  </p:cSld>
+  <p:clrMapOvr>
+    <a:masterClrMapping/>
+  </p:clrMapOvr>
+  <mc:AlternateContent xmlns:mc="http://schemas.openxmlformats.org/markup-compatibility/2006" xmlns:p14="http://schemas.microsoft.com/office/powerpoint/2010/main">
+    <mc:Choice Requires="p14">
+      <p:transition spd="med" p14:dur="700">
+        <p:fade/>
+      </p:transition>
+    </mc:Choice>
+    <mc:Fallback xmlns="">
+      <p:transition spd="med">
+        <p:fade/>
+      </p:transition>
+    </mc:Fallback>
+  </mc:AlternateContent>
+</p:sld>
+</file>
+
 <file path=ppt/slides/slide6.xml><?xml version="1.0" encoding="utf-8"?>
 <p:sld xmlns:a="http://schemas.openxmlformats.org/drawingml/2006/main" xmlns:r="http://schemas.openxmlformats.org/officeDocument/2006/relationships" xmlns:p="http://schemas.openxmlformats.org/presentationml/2006/main">
   <p:cSld>
@@ -9274,7 +9125,7 @@
           <a:p>
             <a:r>
               <a:rPr lang="en-US" dirty="0"/>
-              <a:t>Agenda</a:t>
+              <a:t>Setup</a:t>
             </a:r>
           </a:p>
         </p:txBody>
@@ -9292,7 +9143,7 @@
         <p:spPr>
           <a:xfrm>
             <a:off x="274702" y="1058862"/>
-            <a:ext cx="11888787" cy="5964710"/>
+            <a:ext cx="11888787" cy="5860066"/>
           </a:xfrm>
         </p:spPr>
         <p:txBody>
@@ -9301,81 +9152,91 @@
           <a:p>
             <a:r>
               <a:rPr lang="en-US" dirty="0"/>
-              <a:t>Overview and Scenario</a:t>
-            </a:r>
-          </a:p>
-          <a:p>
+              <a:t>Azure Pass</a:t>
+            </a:r>
+          </a:p>
+          <a:p>
+            <a:pPr lvl="1"/>
             <a:r>
               <a:rPr lang="en-US" dirty="0"/>
-              <a:t>Phase 1 – 11:00 – 2:15</a:t>
+              <a:t>Take a look at your Azure Pass guide</a:t>
             </a:r>
           </a:p>
           <a:p>
             <a:pPr lvl="1"/>
             <a:r>
               <a:rPr lang="en-US" dirty="0"/>
-              <a:t>Tour of the Cognitive Services and DocumentDB</a:t>
+              <a:t>Log into Portal</a:t>
             </a:r>
           </a:p>
           <a:p>
             <a:pPr lvl="1"/>
             <a:r>
               <a:rPr lang="en-US" dirty="0"/>
-              <a:t>Hands-on – Calling Vision Services, Writing to DocumentDB</a:t>
+              <a:t>Visual Studio: Don’t have it? Deploy a VM!</a:t>
             </a:r>
           </a:p>
           <a:p>
             <a:r>
               <a:rPr lang="en-US" dirty="0"/>
-              <a:t>Phase 2 – 2:15 – 3:30</a:t>
+              <a:t>Code</a:t>
             </a:r>
           </a:p>
           <a:p>
             <a:pPr lvl="1"/>
             <a:r>
               <a:rPr lang="en-US" dirty="0"/>
-              <a:t>Tour of Azure Search</a:t>
-            </a:r>
+              <a:t>Go to our GitHub Repo: </a:t>
+            </a:r>
+            <a:r>
+              <a:rPr lang="en-US" dirty="0">
+                <a:hlinkClick r:id="rId3"/>
+              </a:rPr>
+              <a:t>https://github.com/noodlefrenzy/CognitiveServicesTutorial</a:t>
+            </a:r>
+            <a:endParaRPr lang="en-US" dirty="0"/>
           </a:p>
           <a:p>
             <a:pPr lvl="1"/>
             <a:r>
               <a:rPr lang="en-US" dirty="0"/>
-              <a:t>Hands-on –Building and Querying an Index</a:t>
-            </a:r>
-          </a:p>
-          <a:p>
+              <a:t>Clone Locally</a:t>
+            </a:r>
+          </a:p>
+          <a:p>
+            <a:pPr lvl="1"/>
             <a:r>
               <a:rPr lang="en-US" dirty="0"/>
-              <a:t>Phase 3 – 3:30 – 5:00</a:t>
+              <a:t>Load up LabManual.md</a:t>
             </a:r>
           </a:p>
           <a:p>
             <a:pPr lvl="1"/>
             <a:r>
               <a:rPr lang="en-US" dirty="0"/>
-              <a:t>Tour of the Bot Framework</a:t>
+              <a:t>Code for all tracks is available at: </a:t>
+            </a:r>
+            <a:r>
+              <a:rPr lang="en-US" dirty="0">
+                <a:hlinkClick r:id="rId4"/>
+              </a:rPr>
+              <a:t>https://github.com/Microsoft/AI-Immersion-Workshop</a:t>
+            </a:r>
+            <a:r>
+              <a:rPr lang="en-US" dirty="0"/>
+              <a:t> </a:t>
             </a:r>
           </a:p>
           <a:p>
             <a:pPr lvl="1"/>
-            <a:r>
-              <a:rPr lang="en-US" dirty="0"/>
-              <a:t>Hands-on – Building a Query Bot</a:t>
-            </a:r>
-          </a:p>
-          <a:p>
-            <a:r>
-              <a:rPr lang="en-US" dirty="0"/>
-              <a:t>Concluding Remarks</a:t>
-            </a:r>
+            <a:endParaRPr lang="en-US" dirty="0"/>
           </a:p>
         </p:txBody>
       </p:sp>
     </p:spTree>
     <p:extLst>
       <p:ext uri="{BB962C8B-B14F-4D97-AF65-F5344CB8AC3E}">
-        <p14:creationId xmlns:p14="http://schemas.microsoft.com/office/powerpoint/2010/main" val="3859324103"/>
+        <p14:creationId xmlns:p14="http://schemas.microsoft.com/office/powerpoint/2010/main" val="2033139301"/>
       </p:ext>
     </p:extLst>
   </p:cSld>
@@ -9416,173 +9277,6 @@
       </p:grpSpPr>
       <p:sp>
         <p:nvSpPr>
-          <p:cNvPr id="17" name="Title 16"/>
-          <p:cNvSpPr>
-            <a:spLocks noGrp="1"/>
-          </p:cNvSpPr>
-          <p:nvPr>
-            <p:ph type="title"/>
-          </p:nvPr>
-        </p:nvSpPr>
-        <p:spPr/>
-        <p:txBody>
-          <a:bodyPr/>
-          <a:lstStyle/>
-          <a:p>
-            <a:r>
-              <a:rPr lang="en-US" dirty="0"/>
-              <a:t>Setup</a:t>
-            </a:r>
-          </a:p>
-        </p:txBody>
-      </p:sp>
-      <p:sp>
-        <p:nvSpPr>
-          <p:cNvPr id="6" name="Text Placeholder 5"/>
-          <p:cNvSpPr>
-            <a:spLocks noGrp="1"/>
-          </p:cNvSpPr>
-          <p:nvPr>
-            <p:ph type="body" sz="quarter" idx="10"/>
-          </p:nvPr>
-        </p:nvSpPr>
-        <p:spPr>
-          <a:xfrm>
-            <a:off x="274702" y="1058862"/>
-            <a:ext cx="11888787" cy="5860066"/>
-          </a:xfrm>
-        </p:spPr>
-        <p:txBody>
-          <a:bodyPr/>
-          <a:lstStyle/>
-          <a:p>
-            <a:r>
-              <a:rPr lang="en-US" dirty="0"/>
-              <a:t>Azure Pass</a:t>
-            </a:r>
-          </a:p>
-          <a:p>
-            <a:pPr lvl="1"/>
-            <a:r>
-              <a:rPr lang="en-US" dirty="0"/>
-              <a:t>Take a look at your Azure Pass guide</a:t>
-            </a:r>
-          </a:p>
-          <a:p>
-            <a:pPr lvl="1"/>
-            <a:r>
-              <a:rPr lang="en-US" dirty="0"/>
-              <a:t>Log into Portal</a:t>
-            </a:r>
-          </a:p>
-          <a:p>
-            <a:pPr lvl="1"/>
-            <a:r>
-              <a:rPr lang="en-US" dirty="0"/>
-              <a:t>Visual Studio: Don’t have it? Deploy a VM!</a:t>
-            </a:r>
-          </a:p>
-          <a:p>
-            <a:r>
-              <a:rPr lang="en-US" dirty="0"/>
-              <a:t>Code</a:t>
-            </a:r>
-          </a:p>
-          <a:p>
-            <a:pPr lvl="1"/>
-            <a:r>
-              <a:rPr lang="en-US" dirty="0"/>
-              <a:t>Go to our GitHub Repo: </a:t>
-            </a:r>
-            <a:r>
-              <a:rPr lang="en-US" dirty="0">
-                <a:hlinkClick r:id="rId3"/>
-              </a:rPr>
-              <a:t>https://github.com/noodlefrenzy/CognitiveServicesTutorial</a:t>
-            </a:r>
-            <a:endParaRPr lang="en-US" dirty="0"/>
-          </a:p>
-          <a:p>
-            <a:pPr lvl="1"/>
-            <a:r>
-              <a:rPr lang="en-US" dirty="0"/>
-              <a:t>Clone Locally</a:t>
-            </a:r>
-          </a:p>
-          <a:p>
-            <a:pPr lvl="1"/>
-            <a:r>
-              <a:rPr lang="en-US" dirty="0"/>
-              <a:t>Load up LabManual.md</a:t>
-            </a:r>
-          </a:p>
-          <a:p>
-            <a:pPr lvl="1"/>
-            <a:r>
-              <a:rPr lang="en-US" dirty="0"/>
-              <a:t>Code for all tracks is available at: </a:t>
-            </a:r>
-            <a:r>
-              <a:rPr lang="en-US" dirty="0">
-                <a:hlinkClick r:id="rId4"/>
-              </a:rPr>
-              <a:t>https://github.com/Microsoft/AI-Immersion-Workshop</a:t>
-            </a:r>
-            <a:r>
-              <a:rPr lang="en-US" dirty="0"/>
-              <a:t> </a:t>
-            </a:r>
-          </a:p>
-          <a:p>
-            <a:pPr lvl="1"/>
-            <a:endParaRPr lang="en-US" dirty="0"/>
-          </a:p>
-        </p:txBody>
-      </p:sp>
-    </p:spTree>
-    <p:extLst>
-      <p:ext uri="{BB962C8B-B14F-4D97-AF65-F5344CB8AC3E}">
-        <p14:creationId xmlns:p14="http://schemas.microsoft.com/office/powerpoint/2010/main" val="2033139301"/>
-      </p:ext>
-    </p:extLst>
-  </p:cSld>
-  <p:clrMapOvr>
-    <a:masterClrMapping/>
-  </p:clrMapOvr>
-  <mc:AlternateContent xmlns:mc="http://schemas.openxmlformats.org/markup-compatibility/2006" xmlns:p14="http://schemas.microsoft.com/office/powerpoint/2010/main">
-    <mc:Choice Requires="p14">
-      <p:transition spd="med" p14:dur="700">
-        <p:fade/>
-      </p:transition>
-    </mc:Choice>
-    <mc:Fallback xmlns="">
-      <p:transition spd="med">
-        <p:fade/>
-      </p:transition>
-    </mc:Fallback>
-  </mc:AlternateContent>
-</p:sld>
-</file>
-
-<file path=ppt/slides/slide8.xml><?xml version="1.0" encoding="utf-8"?>
-<p:sld xmlns:a="http://schemas.openxmlformats.org/drawingml/2006/main" xmlns:r="http://schemas.openxmlformats.org/officeDocument/2006/relationships" xmlns:p="http://schemas.openxmlformats.org/presentationml/2006/main">
-  <p:cSld>
-    <p:spTree>
-      <p:nvGrpSpPr>
-        <p:cNvPr id="1" name=""/>
-        <p:cNvGrpSpPr/>
-        <p:nvPr/>
-      </p:nvGrpSpPr>
-      <p:grpSpPr>
-        <a:xfrm>
-          <a:off x="0" y="0"/>
-          <a:ext cx="0" cy="0"/>
-          <a:chOff x="0" y="0"/>
-          <a:chExt cx="0" cy="0"/>
-        </a:xfrm>
-      </p:grpSpPr>
-      <p:sp>
-        <p:nvSpPr>
           <p:cNvPr id="2" name="Title 1"/>
           <p:cNvSpPr>
             <a:spLocks noGrp="1"/>
@@ -9722,7 +9416,7 @@
 </p:sld>
 </file>
 
-<file path=ppt/slides/slide9.xml><?xml version="1.0" encoding="utf-8"?>
+<file path=ppt/slides/slide8.xml><?xml version="1.0" encoding="utf-8"?>
 <p:sld xmlns:a="http://schemas.openxmlformats.org/drawingml/2006/main" xmlns:r="http://schemas.openxmlformats.org/officeDocument/2006/relationships" xmlns:p="http://schemas.openxmlformats.org/presentationml/2006/main">
   <p:cSld>
     <p:spTree>
@@ -10625,9 +10319,12 @@
 </file>
 
 <file path=customXml/item1.xml><?xml version="1.0" encoding="utf-8"?>
-<p:properties xmlns:p="http://schemas.microsoft.com/office/2006/metadata/properties" xmlns:xsi="http://www.w3.org/2001/XMLSchema-instance" xmlns:pc="http://schemas.microsoft.com/office/infopath/2007/PartnerControls">
-  <documentManagement/>
-</p:properties>
+<?mso-contentType ?>
+<FormTemplates xmlns="http://schemas.microsoft.com/sharepoint/v3/contenttype/forms">
+  <Display>DocumentLibraryForm</Display>
+  <Edit>DocumentLibraryForm</Edit>
+  <New>DocumentLibraryForm</New>
+</FormTemplates>
 </file>
 
 <file path=customXml/item2.xml><?xml version="1.0" encoding="utf-8"?>
@@ -10785,26 +10482,15 @@
 </file>
 
 <file path=customXml/item3.xml><?xml version="1.0" encoding="utf-8"?>
-<?mso-contentType ?>
-<FormTemplates xmlns="http://schemas.microsoft.com/sharepoint/v3/contenttype/forms">
-  <Display>DocumentLibraryForm</Display>
-  <Edit>DocumentLibraryForm</Edit>
-  <New>DocumentLibraryForm</New>
-</FormTemplates>
+<p:properties xmlns:p="http://schemas.microsoft.com/office/2006/metadata/properties" xmlns:xsi="http://www.w3.org/2001/XMLSchema-instance" xmlns:pc="http://schemas.microsoft.com/office/infopath/2007/PartnerControls">
+  <documentManagement/>
+</p:properties>
 </file>
 
 <file path=customXml/itemProps1.xml><?xml version="1.0" encoding="utf-8"?>
-<ds:datastoreItem xmlns:ds="http://schemas.openxmlformats.org/officeDocument/2006/customXml" ds:itemID="{F990F116-B58F-4255-B05B-DA3808E0E5C6}">
+<ds:datastoreItem xmlns:ds="http://schemas.openxmlformats.org/officeDocument/2006/customXml" ds:itemID="{758FDAC0-319D-4A54-8D8E-1D42CB1F8004}">
   <ds:schemaRefs>
-    <ds:schemaRef ds:uri="http://schemas.microsoft.com/office/2006/documentManagement/types"/>
-    <ds:schemaRef ds:uri="http://purl.org/dc/terms/"/>
-    <ds:schemaRef ds:uri="http://schemas.microsoft.com/office/2006/metadata/properties"/>
-    <ds:schemaRef ds:uri="http://schemas.openxmlformats.org/package/2006/metadata/core-properties"/>
-    <ds:schemaRef ds:uri="http://www.w3.org/XML/1998/namespace"/>
-    <ds:schemaRef ds:uri="http://schemas.microsoft.com/office/infopath/2007/PartnerControls"/>
-    <ds:schemaRef ds:uri="630a2e83-186a-4a0f-ab27-bee8a8096abc"/>
-    <ds:schemaRef ds:uri="http://purl.org/dc/dcmitype/"/>
-    <ds:schemaRef ds:uri="http://purl.org/dc/elements/1.1/"/>
+    <ds:schemaRef ds:uri="http://schemas.microsoft.com/sharepoint/v3/contenttype/forms"/>
   </ds:schemaRefs>
 </ds:datastoreItem>
 </file>
@@ -10828,9 +10514,17 @@
 </file>
 
 <file path=customXml/itemProps3.xml><?xml version="1.0" encoding="utf-8"?>
-<ds:datastoreItem xmlns:ds="http://schemas.openxmlformats.org/officeDocument/2006/customXml" ds:itemID="{758FDAC0-319D-4A54-8D8E-1D42CB1F8004}">
+<ds:datastoreItem xmlns:ds="http://schemas.openxmlformats.org/officeDocument/2006/customXml" ds:itemID="{F990F116-B58F-4255-B05B-DA3808E0E5C6}">
   <ds:schemaRefs>
-    <ds:schemaRef ds:uri="http://schemas.microsoft.com/sharepoint/v3/contenttype/forms"/>
+    <ds:schemaRef ds:uri="http://schemas.microsoft.com/office/2006/documentManagement/types"/>
+    <ds:schemaRef ds:uri="http://purl.org/dc/terms/"/>
+    <ds:schemaRef ds:uri="http://schemas.microsoft.com/office/2006/metadata/properties"/>
+    <ds:schemaRef ds:uri="http://schemas.openxmlformats.org/package/2006/metadata/core-properties"/>
+    <ds:schemaRef ds:uri="http://www.w3.org/XML/1998/namespace"/>
+    <ds:schemaRef ds:uri="http://schemas.microsoft.com/office/infopath/2007/PartnerControls"/>
+    <ds:schemaRef ds:uri="630a2e83-186a-4a0f-ab27-bee8a8096abc"/>
+    <ds:schemaRef ds:uri="http://purl.org/dc/dcmitype/"/>
+    <ds:schemaRef ds:uri="http://purl.org/dc/elements/1.1/"/>
   </ds:schemaRefs>
 </ds:datastoreItem>
 </file>
</xml_diff>